<commit_message>
Lesson 4 Add homework and presentation
</commit_message>
<xml_diff>
--- a/presentation/04. Networking web and error handling.pptx
+++ b/presentation/04. Networking web and error handling.pptx
@@ -5,7 +5,7 @@
     <p:sldMasterId id="2147483648" r:id="rId1"/>
   </p:sldMasterIdLst>
   <p:notesMasterIdLst>
-    <p:notesMasterId r:id="rId38"/>
+    <p:notesMasterId r:id="rId40"/>
   </p:notesMasterIdLst>
   <p:sldIdLst>
     <p:sldId id="256" r:id="rId2"/>
@@ -42,8 +42,10 @@
     <p:sldId id="309" r:id="rId33"/>
     <p:sldId id="310" r:id="rId34"/>
     <p:sldId id="311" r:id="rId35"/>
-    <p:sldId id="280" r:id="rId36"/>
-    <p:sldId id="281" r:id="rId37"/>
+    <p:sldId id="312" r:id="rId36"/>
+    <p:sldId id="313" r:id="rId37"/>
+    <p:sldId id="280" r:id="rId38"/>
+    <p:sldId id="281" r:id="rId39"/>
   </p:sldIdLst>
   <p:sldSz cx="12192000" cy="6858000"/>
   <p:notesSz cx="6858000" cy="9144000"/>
@@ -8620,6 +8622,358 @@
       </p:grpSpPr>
       <p:pic>
         <p:nvPicPr>
+          <p:cNvPr id="125" name="image5.jpeg" descr="Рисунок 4"/>
+          <p:cNvPicPr>
+            <a:picLocks noChangeAspect="1"/>
+          </p:cNvPicPr>
+          <p:nvPr/>
+        </p:nvPicPr>
+        <p:blipFill>
+          <a:blip r:embed="rId2">
+            <a:extLst/>
+          </a:blip>
+          <a:srcRect b="75899"/>
+          <a:stretch>
+            <a:fillRect/>
+          </a:stretch>
+        </p:blipFill>
+        <p:spPr>
+          <a:xfrm>
+            <a:off x="0" y="-6350"/>
+            <a:ext cx="12192000" cy="1224278"/>
+          </a:xfrm>
+          <a:prstGeom prst="rect">
+            <a:avLst/>
+          </a:prstGeom>
+          <a:ln w="12700">
+            <a:miter lim="400000"/>
+          </a:ln>
+        </p:spPr>
+      </p:pic>
+      <p:sp>
+        <p:nvSpPr>
+          <p:cNvPr id="126" name="Shape 126" descr="Заголовок 1"/>
+          <p:cNvSpPr>
+            <a:spLocks noGrp="1"/>
+          </p:cNvSpPr>
+          <p:nvPr>
+            <p:ph type="ctrTitle"/>
+          </p:nvPr>
+        </p:nvSpPr>
+        <p:spPr>
+          <a:xfrm>
+            <a:off x="650446" y="304800"/>
+            <a:ext cx="10808129" cy="602012"/>
+          </a:xfrm>
+          <a:prstGeom prst="rect">
+            <a:avLst/>
+          </a:prstGeom>
+        </p:spPr>
+        <p:txBody>
+          <a:bodyPr/>
+          <a:lstStyle>
+            <a:lvl1pPr algn="l">
+              <a:defRPr sz="3000">
+                <a:solidFill>
+                  <a:srgbClr val="3B3838"/>
+                </a:solidFill>
+                <a:latin typeface="Open Sans"/>
+                <a:ea typeface="Open Sans"/>
+                <a:cs typeface="Open Sans"/>
+                <a:sym typeface="Open Sans"/>
+              </a:defRPr>
+            </a:lvl1pPr>
+          </a:lstStyle>
+          <a:p>
+            <a:r>
+              <a:rPr lang="en-US" dirty="0"/>
+              <a:t>Error handling best </a:t>
+            </a:r>
+            <a:r>
+              <a:rPr lang="en-US" dirty="0" smtClean="0"/>
+              <a:t>practice</a:t>
+            </a:r>
+            <a:r>
+              <a:rPr lang="ru-RU" dirty="0" smtClean="0"/>
+              <a:t> - </a:t>
+            </a:r>
+            <a:r>
+              <a:rPr lang="en-US" dirty="0" smtClean="0"/>
+              <a:t>Do not forget</a:t>
+            </a:r>
+            <a:endParaRPr dirty="0"/>
+          </a:p>
+        </p:txBody>
+      </p:sp>
+      <p:pic>
+        <p:nvPicPr>
+          <p:cNvPr id="127" name="image1.png" descr="Рисунок 8"/>
+          <p:cNvPicPr>
+            <a:picLocks noChangeAspect="1"/>
+          </p:cNvPicPr>
+          <p:nvPr/>
+        </p:nvPicPr>
+        <p:blipFill>
+          <a:blip r:embed="rId3">
+            <a:alphaModFix amt="40312"/>
+            <a:extLst/>
+          </a:blip>
+          <a:stretch>
+            <a:fillRect/>
+          </a:stretch>
+        </p:blipFill>
+        <p:spPr>
+          <a:xfrm>
+            <a:off x="10240129" y="6026089"/>
+            <a:ext cx="1373567" cy="287493"/>
+          </a:xfrm>
+          <a:prstGeom prst="rect">
+            <a:avLst/>
+          </a:prstGeom>
+          <a:ln w="12700">
+            <a:miter lim="400000"/>
+          </a:ln>
+        </p:spPr>
+      </p:pic>
+      <p:pic>
+        <p:nvPicPr>
+          <p:cNvPr id="2" name="Picture 1"/>
+          <p:cNvPicPr>
+            <a:picLocks noChangeAspect="1"/>
+          </p:cNvPicPr>
+          <p:nvPr/>
+        </p:nvPicPr>
+        <p:blipFill>
+          <a:blip r:embed="rId4">
+            <a:extLst>
+              <a:ext uri="{28A0092B-C50C-407E-A947-70E740481C1C}">
+                <a14:useLocalDpi xmlns:a14="http://schemas.microsoft.com/office/drawing/2010/main" val="0"/>
+              </a:ext>
+            </a:extLst>
+          </a:blip>
+          <a:stretch>
+            <a:fillRect/>
+          </a:stretch>
+        </p:blipFill>
+        <p:spPr>
+          <a:xfrm>
+            <a:off x="2294994" y="2590683"/>
+            <a:ext cx="7602011" cy="1676634"/>
+          </a:xfrm>
+          <a:prstGeom prst="rect">
+            <a:avLst/>
+          </a:prstGeom>
+        </p:spPr>
+      </p:pic>
+    </p:spTree>
+    <p:extLst>
+      <p:ext uri="{BB962C8B-B14F-4D97-AF65-F5344CB8AC3E}">
+        <p14:creationId xmlns:p14="http://schemas.microsoft.com/office/powerpoint/2010/main" val="4275304358"/>
+      </p:ext>
+    </p:extLst>
+  </p:cSld>
+  <p:clrMapOvr>
+    <a:masterClrMapping/>
+  </p:clrMapOvr>
+  <p:transition spd="slow"/>
+</p:sld>
+</file>
+
+<file path=ppt/slides/slide36.xml><?xml version="1.0" encoding="utf-8"?>
+<p:sld xmlns:a="http://schemas.openxmlformats.org/drawingml/2006/main" xmlns:r="http://schemas.openxmlformats.org/officeDocument/2006/relationships" xmlns:p="http://schemas.openxmlformats.org/presentationml/2006/main">
+  <p:cSld>
+    <p:spTree>
+      <p:nvGrpSpPr>
+        <p:cNvPr id="1" name=""/>
+        <p:cNvGrpSpPr/>
+        <p:nvPr/>
+      </p:nvGrpSpPr>
+      <p:grpSpPr>
+        <a:xfrm>
+          <a:off x="0" y="0"/>
+          <a:ext cx="0" cy="0"/>
+          <a:chOff x="0" y="0"/>
+          <a:chExt cx="0" cy="0"/>
+        </a:xfrm>
+      </p:grpSpPr>
+      <p:pic>
+        <p:nvPicPr>
+          <p:cNvPr id="125" name="image5.jpeg" descr="Рисунок 4"/>
+          <p:cNvPicPr>
+            <a:picLocks noChangeAspect="1"/>
+          </p:cNvPicPr>
+          <p:nvPr/>
+        </p:nvPicPr>
+        <p:blipFill>
+          <a:blip r:embed="rId2">
+            <a:extLst/>
+          </a:blip>
+          <a:srcRect b="75899"/>
+          <a:stretch>
+            <a:fillRect/>
+          </a:stretch>
+        </p:blipFill>
+        <p:spPr>
+          <a:xfrm>
+            <a:off x="0" y="-6350"/>
+            <a:ext cx="12192000" cy="1224278"/>
+          </a:xfrm>
+          <a:prstGeom prst="rect">
+            <a:avLst/>
+          </a:prstGeom>
+          <a:ln w="12700">
+            <a:miter lim="400000"/>
+          </a:ln>
+        </p:spPr>
+      </p:pic>
+      <p:sp>
+        <p:nvSpPr>
+          <p:cNvPr id="126" name="Shape 126" descr="Заголовок 1"/>
+          <p:cNvSpPr>
+            <a:spLocks noGrp="1"/>
+          </p:cNvSpPr>
+          <p:nvPr>
+            <p:ph type="ctrTitle"/>
+          </p:nvPr>
+        </p:nvSpPr>
+        <p:spPr>
+          <a:xfrm>
+            <a:off x="650446" y="304800"/>
+            <a:ext cx="10808129" cy="602012"/>
+          </a:xfrm>
+          <a:prstGeom prst="rect">
+            <a:avLst/>
+          </a:prstGeom>
+        </p:spPr>
+        <p:txBody>
+          <a:bodyPr/>
+          <a:lstStyle>
+            <a:lvl1pPr algn="l">
+              <a:defRPr sz="3000">
+                <a:solidFill>
+                  <a:srgbClr val="3B3838"/>
+                </a:solidFill>
+                <a:latin typeface="Open Sans"/>
+                <a:ea typeface="Open Sans"/>
+                <a:cs typeface="Open Sans"/>
+                <a:sym typeface="Open Sans"/>
+              </a:defRPr>
+            </a:lvl1pPr>
+          </a:lstStyle>
+          <a:p>
+            <a:r>
+              <a:rPr lang="en-US" dirty="0"/>
+              <a:t>Error handling best </a:t>
+            </a:r>
+            <a:r>
+              <a:rPr lang="en-US" dirty="0" smtClean="0"/>
+              <a:t>practice</a:t>
+            </a:r>
+            <a:r>
+              <a:rPr lang="ru-RU" dirty="0" smtClean="0"/>
+              <a:t> - </a:t>
+            </a:r>
+            <a:r>
+              <a:rPr lang="en-US" dirty="0" smtClean="0"/>
+              <a:t>Do not forget</a:t>
+            </a:r>
+            <a:endParaRPr dirty="0"/>
+          </a:p>
+        </p:txBody>
+      </p:sp>
+      <p:pic>
+        <p:nvPicPr>
+          <p:cNvPr id="127" name="image1.png" descr="Рисунок 8"/>
+          <p:cNvPicPr>
+            <a:picLocks noChangeAspect="1"/>
+          </p:cNvPicPr>
+          <p:nvPr/>
+        </p:nvPicPr>
+        <p:blipFill>
+          <a:blip r:embed="rId3">
+            <a:alphaModFix amt="40312"/>
+            <a:extLst/>
+          </a:blip>
+          <a:stretch>
+            <a:fillRect/>
+          </a:stretch>
+        </p:blipFill>
+        <p:spPr>
+          <a:xfrm>
+            <a:off x="10240129" y="6026089"/>
+            <a:ext cx="1373567" cy="287493"/>
+          </a:xfrm>
+          <a:prstGeom prst="rect">
+            <a:avLst/>
+          </a:prstGeom>
+          <a:ln w="12700">
+            <a:miter lim="400000"/>
+          </a:ln>
+        </p:spPr>
+      </p:pic>
+      <p:pic>
+        <p:nvPicPr>
+          <p:cNvPr id="3" name="Picture 2"/>
+          <p:cNvPicPr>
+            <a:picLocks noChangeAspect="1"/>
+          </p:cNvPicPr>
+          <p:nvPr/>
+        </p:nvPicPr>
+        <p:blipFill>
+          <a:blip r:embed="rId4">
+            <a:extLst>
+              <a:ext uri="{28A0092B-C50C-407E-A947-70E740481C1C}">
+                <a14:useLocalDpi xmlns:a14="http://schemas.microsoft.com/office/drawing/2010/main" val="0"/>
+              </a:ext>
+            </a:extLst>
+          </a:blip>
+          <a:stretch>
+            <a:fillRect/>
+          </a:stretch>
+        </p:blipFill>
+        <p:spPr>
+          <a:xfrm>
+            <a:off x="3271443" y="2652604"/>
+            <a:ext cx="5649114" cy="1552792"/>
+          </a:xfrm>
+          <a:prstGeom prst="rect">
+            <a:avLst/>
+          </a:prstGeom>
+        </p:spPr>
+      </p:pic>
+    </p:spTree>
+    <p:extLst>
+      <p:ext uri="{BB962C8B-B14F-4D97-AF65-F5344CB8AC3E}">
+        <p14:creationId xmlns:p14="http://schemas.microsoft.com/office/powerpoint/2010/main" val="219057337"/>
+      </p:ext>
+    </p:extLst>
+  </p:cSld>
+  <p:clrMapOvr>
+    <a:masterClrMapping/>
+  </p:clrMapOvr>
+  <p:transition spd="slow"/>
+</p:sld>
+</file>
+
+<file path=ppt/slides/slide37.xml><?xml version="1.0" encoding="utf-8"?>
+<p:sld xmlns:a="http://schemas.openxmlformats.org/drawingml/2006/main" xmlns:r="http://schemas.openxmlformats.org/officeDocument/2006/relationships" xmlns:p="http://schemas.openxmlformats.org/presentationml/2006/main">
+  <p:cSld>
+    <p:spTree>
+      <p:nvGrpSpPr>
+        <p:cNvPr id="1" name=""/>
+        <p:cNvGrpSpPr/>
+        <p:nvPr/>
+      </p:nvGrpSpPr>
+      <p:grpSpPr>
+        <a:xfrm>
+          <a:off x="0" y="0"/>
+          <a:ext cx="0" cy="0"/>
+          <a:chOff x="0" y="0"/>
+          <a:chExt cx="0" cy="0"/>
+        </a:xfrm>
+      </p:grpSpPr>
+      <p:pic>
+        <p:nvPicPr>
           <p:cNvPr id="230" name="image5.jpeg" descr="Рисунок 4"/>
           <p:cNvPicPr>
             <a:picLocks noChangeAspect="1"/>
@@ -8757,7 +9111,7 @@
 </p:sld>
 </file>
 
-<file path=ppt/slides/slide36.xml><?xml version="1.0" encoding="utf-8"?>
+<file path=ppt/slides/slide38.xml><?xml version="1.0" encoding="utf-8"?>
 <p:sld xmlns:a="http://schemas.openxmlformats.org/drawingml/2006/main" xmlns:r="http://schemas.openxmlformats.org/officeDocument/2006/relationships" xmlns:p="http://schemas.openxmlformats.org/presentationml/2006/main">
   <p:cSld>
     <p:spTree>

</xml_diff>